<commit_message>
modify t_trans to make it taikaku matrix in by_greedy
</commit_message>
<xml_diff>
--- a/中間発表/BQ16048_中間発表_関_パワポ2.pptx
+++ b/中間発表/BQ16048_中間発表_関_パワポ2.pptx
@@ -883,7 +883,7 @@
           <a:p>
             <a:fld id="{D62E54BB-EC33-406F-9547-5B4FD4B59F01}" type="datetimeFigureOut">
               <a:rPr kumimoji="1" lang="ja-JP" altLang="en-US" smtClean="0"/>
-              <a:t>2019/7/4</a:t>
+              <a:t>2019/7/5</a:t>
             </a:fld>
             <a:endParaRPr kumimoji="1" lang="ja-JP" altLang="en-US"/>
           </a:p>
@@ -1119,7 +1119,7 @@
           <a:p>
             <a:fld id="{D62E54BB-EC33-406F-9547-5B4FD4B59F01}" type="datetimeFigureOut">
               <a:rPr kumimoji="1" lang="ja-JP" altLang="en-US" smtClean="0"/>
-              <a:t>2019/7/4</a:t>
+              <a:t>2019/7/5</a:t>
             </a:fld>
             <a:endParaRPr kumimoji="1" lang="ja-JP" altLang="en-US"/>
           </a:p>
@@ -1755,7 +1755,7 @@
           <a:p>
             <a:fld id="{D62E54BB-EC33-406F-9547-5B4FD4B59F01}" type="datetimeFigureOut">
               <a:rPr kumimoji="1" lang="ja-JP" altLang="en-US" smtClean="0"/>
-              <a:t>2019/7/4</a:t>
+              <a:t>2019/7/5</a:t>
             </a:fld>
             <a:endParaRPr kumimoji="1" lang="ja-JP" altLang="en-US"/>
           </a:p>
@@ -2075,7 +2075,7 @@
           <a:p>
             <a:fld id="{D62E54BB-EC33-406F-9547-5B4FD4B59F01}" type="datetimeFigureOut">
               <a:rPr kumimoji="1" lang="ja-JP" altLang="en-US" smtClean="0"/>
-              <a:t>2019/7/4</a:t>
+              <a:t>2019/7/5</a:t>
             </a:fld>
             <a:endParaRPr kumimoji="1" lang="ja-JP" altLang="en-US"/>
           </a:p>
@@ -2530,7 +2530,7 @@
           <a:p>
             <a:fld id="{D62E54BB-EC33-406F-9547-5B4FD4B59F01}" type="datetimeFigureOut">
               <a:rPr kumimoji="1" lang="ja-JP" altLang="en-US" smtClean="0"/>
-              <a:t>2019/7/4</a:t>
+              <a:t>2019/7/5</a:t>
             </a:fld>
             <a:endParaRPr kumimoji="1" lang="ja-JP" altLang="en-US"/>
           </a:p>
@@ -2672,7 +2672,7 @@
           <a:p>
             <a:fld id="{D62E54BB-EC33-406F-9547-5B4FD4B59F01}" type="datetimeFigureOut">
               <a:rPr kumimoji="1" lang="ja-JP" altLang="en-US" smtClean="0"/>
-              <a:t>2019/7/4</a:t>
+              <a:t>2019/7/5</a:t>
             </a:fld>
             <a:endParaRPr kumimoji="1" lang="ja-JP" altLang="en-US"/>
           </a:p>
@@ -2791,7 +2791,7 @@
           <a:p>
             <a:fld id="{D62E54BB-EC33-406F-9547-5B4FD4B59F01}" type="datetimeFigureOut">
               <a:rPr kumimoji="1" lang="ja-JP" altLang="en-US" smtClean="0"/>
-              <a:t>2019/7/4</a:t>
+              <a:t>2019/7/5</a:t>
             </a:fld>
             <a:endParaRPr kumimoji="1" lang="ja-JP" altLang="en-US"/>
           </a:p>
@@ -3124,7 +3124,7 @@
           <a:p>
             <a:fld id="{D62E54BB-EC33-406F-9547-5B4FD4B59F01}" type="datetimeFigureOut">
               <a:rPr kumimoji="1" lang="ja-JP" altLang="en-US" smtClean="0"/>
-              <a:t>2019/7/4</a:t>
+              <a:t>2019/7/5</a:t>
             </a:fld>
             <a:endParaRPr kumimoji="1" lang="ja-JP" altLang="en-US"/>
           </a:p>
@@ -3405,7 +3405,7 @@
           <a:p>
             <a:fld id="{D62E54BB-EC33-406F-9547-5B4FD4B59F01}" type="datetimeFigureOut">
               <a:rPr kumimoji="1" lang="ja-JP" altLang="en-US" smtClean="0"/>
-              <a:t>2019/7/4</a:t>
+              <a:t>2019/7/5</a:t>
             </a:fld>
             <a:endParaRPr kumimoji="1" lang="ja-JP" altLang="en-US"/>
           </a:p>

</xml_diff>